<commit_message>
updated a few slides in week 1
</commit_message>
<xml_diff>
--- a/Lectures2025/CITS5503CloudComputingIntro_week1.pptx
+++ b/Lectures2025/CITS5503CloudComputingIntro_week1.pptx
@@ -26630,7 +26630,7 @@
             </a:r>
             <a:r>
               <a:rPr lang="en-US" sz="2200" dirty="0"/>
-              <a:t>Cloud computing enables on-demand computing resources by providing virtualized computing resources. </a:t>
+              <a:t>Cloud computing enables on-demand computing resources by providing virtual machines as instances. </a:t>
             </a:r>
           </a:p>
           <a:p>
@@ -27271,7 +27271,7 @@
                   <a:srgbClr val="1F2328"/>
                 </a:solidFill>
               </a:rPr>
-              <a:t>Financial institutions must ensure CIA of user data security. By hosting their application in their own data center, the company can better protect their data security.</a:t>
+              <a:t>Financial institutions must ensure user data security. By hosting their application in their own data center, the company can better protect their data security.</a:t>
             </a:r>
           </a:p>
         </p:txBody>
@@ -27605,7 +27605,7 @@
                   <a:srgbClr val="1F2328"/>
                 </a:solidFill>
               </a:rPr>
-              <a:t>Financial institutions must ensure CIA of user data security. By hosting their application in their own data center, the company can better protect their data security.</a:t>
+              <a:t>Financial institutions must ensure user data security. By hosting their application in their own data center, the company can better protect their data security.</a:t>
             </a:r>
           </a:p>
           <a:p>
@@ -27987,7 +27987,7 @@
                   <a:srgbClr val="1F2328"/>
                 </a:solidFill>
               </a:rPr>
-              <a:t>Financial institutions must ensure CIA of user data security. By hosting their application in their own data center, the company can better protect their data security.</a:t>
+              <a:t>Financial institutions must ensure user data security. By hosting their application in their own data center, the company can better protect their data security.</a:t>
             </a:r>
           </a:p>
           <a:p>

</xml_diff>